<commit_message>
day 58 to 60
</commit_message>
<xml_diff>
--- a/_PowerPoints/2nd Semester/Unit 6 Probability and Stats/Algebra4_Day_057 Models.pptx
+++ b/_PowerPoints/2nd Semester/Unit 6 Probability and Stats/Algebra4_Day_057 Models.pptx
@@ -223,7 +223,7 @@
           <a:p>
             <a:fld id="{FAC4242D-6570-4D26-878C-5DE8AD62D39F}" type="datetimeFigureOut">
               <a:rPr lang="en-US" smtClean="0"/>
-              <a:t>3/1/2018</a:t>
+              <a:t>3/2/2018</a:t>
             </a:fld>
             <a:endParaRPr lang="en-US"/>
           </a:p>
@@ -476,7 +476,7 @@
             <a:fld id="{87DE6118-2437-4B30-8E3C-4D2BE6020583}" type="datetimeFigureOut">
               <a:rPr lang="en-US" dirty="0"/>
               <a:pPr/>
-              <a:t>3/1/2018</a:t>
+              <a:t>3/2/2018</a:t>
             </a:fld>
             <a:endParaRPr lang="en-US" dirty="0"/>
           </a:p>
@@ -802,7 +802,7 @@
           <a:p>
             <a:fld id="{87DE6118-2437-4B30-8E3C-4D2BE6020583}" type="datetimeFigureOut">
               <a:rPr lang="en-US" dirty="0"/>
-              <a:t>3/1/2018</a:t>
+              <a:t>3/2/2018</a:t>
             </a:fld>
             <a:endParaRPr lang="en-US" dirty="0"/>
           </a:p>
@@ -977,7 +977,7 @@
           <a:p>
             <a:fld id="{87DE6118-2437-4B30-8E3C-4D2BE6020583}" type="datetimeFigureOut">
               <a:rPr lang="en-US" dirty="0"/>
-              <a:t>3/1/2018</a:t>
+              <a:t>3/2/2018</a:t>
             </a:fld>
             <a:endParaRPr lang="en-US" dirty="0"/>
           </a:p>
@@ -1142,7 +1142,7 @@
           <a:p>
             <a:fld id="{87DE6118-2437-4B30-8E3C-4D2BE6020583}" type="datetimeFigureOut">
               <a:rPr lang="en-US" dirty="0"/>
-              <a:t>3/1/2018</a:t>
+              <a:t>3/2/2018</a:t>
             </a:fld>
             <a:endParaRPr lang="en-US" dirty="0"/>
           </a:p>
@@ -1415,7 +1415,7 @@
             <a:fld id="{87DE6118-2437-4B30-8E3C-4D2BE6020583}" type="datetimeFigureOut">
               <a:rPr lang="en-US" dirty="0"/>
               <a:pPr/>
-              <a:t>3/1/2018</a:t>
+              <a:t>3/2/2018</a:t>
             </a:fld>
             <a:endParaRPr lang="en-US" dirty="0"/>
           </a:p>
@@ -1805,7 +1805,7 @@
           <a:p>
             <a:fld id="{87DE6118-2437-4B30-8E3C-4D2BE6020583}" type="datetimeFigureOut">
               <a:rPr lang="en-US" dirty="0"/>
-              <a:t>3/1/2018</a:t>
+              <a:t>3/2/2018</a:t>
             </a:fld>
             <a:endParaRPr lang="en-US" dirty="0"/>
           </a:p>
@@ -2277,7 +2277,7 @@
           <a:p>
             <a:fld id="{87DE6118-2437-4B30-8E3C-4D2BE6020583}" type="datetimeFigureOut">
               <a:rPr lang="en-US" dirty="0"/>
-              <a:t>3/1/2018</a:t>
+              <a:t>3/2/2018</a:t>
             </a:fld>
             <a:endParaRPr lang="en-US" dirty="0"/>
           </a:p>
@@ -2390,7 +2390,7 @@
           <a:p>
             <a:fld id="{87DE6118-2437-4B30-8E3C-4D2BE6020583}" type="datetimeFigureOut">
               <a:rPr lang="en-US" dirty="0"/>
-              <a:t>3/1/2018</a:t>
+              <a:t>3/2/2018</a:t>
             </a:fld>
             <a:endParaRPr lang="en-US" dirty="0"/>
           </a:p>
@@ -2480,7 +2480,7 @@
           <a:p>
             <a:fld id="{87DE6118-2437-4B30-8E3C-4D2BE6020583}" type="datetimeFigureOut">
               <a:rPr lang="en-US" dirty="0"/>
-              <a:t>3/1/2018</a:t>
+              <a:t>3/2/2018</a:t>
             </a:fld>
             <a:endParaRPr lang="en-US" dirty="0"/>
           </a:p>
@@ -2822,7 +2822,7 @@
             <a:fld id="{87DE6118-2437-4B30-8E3C-4D2BE6020583}" type="datetimeFigureOut">
               <a:rPr lang="en-US" dirty="0"/>
               <a:pPr/>
-              <a:t>3/1/2018</a:t>
+              <a:t>3/2/2018</a:t>
             </a:fld>
             <a:endParaRPr lang="en-US" dirty="0"/>
           </a:p>
@@ -3207,7 +3207,7 @@
             <a:fld id="{87DE6118-2437-4B30-8E3C-4D2BE6020583}" type="datetimeFigureOut">
               <a:rPr lang="en-US" dirty="0"/>
               <a:pPr/>
-              <a:t>3/1/2018</a:t>
+              <a:t>3/2/2018</a:t>
             </a:fld>
             <a:endParaRPr lang="en-US" dirty="0"/>
           </a:p>
@@ -3482,7 +3482,7 @@
             <a:fld id="{87DE6118-2437-4B30-8E3C-4D2BE6020583}" type="datetimeFigureOut">
               <a:rPr lang="en-US" dirty="0"/>
               <a:pPr/>
-              <a:t>3/1/2018</a:t>
+              <a:t>3/2/2018</a:t>
             </a:fld>
             <a:endParaRPr lang="en-US" dirty="0"/>
           </a:p>
@@ -4030,11 +4030,7 @@
           <a:p>
             <a:r>
               <a:rPr lang="en-US" dirty="0" smtClean="0"/>
-              <a:t>Day </a:t>
-            </a:r>
-            <a:r>
-              <a:rPr lang="en-US" dirty="0" smtClean="0"/>
-              <a:t>57</a:t>
+              <a:t>Day 57</a:t>
             </a:r>
             <a:endParaRPr lang="en-US" dirty="0"/>
           </a:p>
@@ -4391,11 +4387,15 @@
             </a:pPr>
             <a:r>
               <a:rPr lang="en-US" sz="3400" dirty="0"/>
-              <a:t>A teacher wants to </a:t>
+              <a:t>A teacher </a:t>
             </a:r>
             <a:r>
               <a:rPr lang="en-US" sz="3400" dirty="0" smtClean="0"/>
-              <a:t>agrees to roll dice. If it is even there will be no homework, and if it is odd then there will be homework. </a:t>
+              <a:t>agrees </a:t>
+            </a:r>
+            <a:r>
+              <a:rPr lang="en-US" sz="3400" dirty="0" smtClean="0"/>
+              <a:t>to roll dice. If it is even there will be no homework, and if it is odd then there will be homework. </a:t>
             </a:r>
             <a:endParaRPr lang="en-US" sz="3400" dirty="0"/>
           </a:p>
@@ -7384,8 +7384,8 @@
           <a:lstStyle/>
           <a:p>
             <a:r>
-              <a:rPr lang="en-US" dirty="0" smtClean="0"/>
-              <a:t>For Next Time</a:t>
+              <a:rPr lang="en-US" smtClean="0"/>
+              <a:t>From Last Time</a:t>
             </a:r>
             <a:endParaRPr lang="en-US" dirty="0"/>
           </a:p>

</xml_diff>